<commit_message>
Update 2021-12-02 FEC - FECFile Online - Weekly Check-in.pptx
</commit_message>
<xml_diff>
--- a/MeetingNotes/2021-12-02 FEC - FECFile Online - Weekly Check-in.pptx
+++ b/MeetingNotes/2021-12-02 FEC - FECFile Online - Weekly Check-in.pptx
@@ -314,7 +314,7 @@
           <p:cNvPr id="2" name="Header Placeholder 1">
             <a:extLst>
               <a:ext uri="{FF2B5EF4-FFF2-40B4-BE49-F238E27FC236}">
-                <a16:creationId xmlns="" xmlns:a16="http://schemas.microsoft.com/office/drawing/2014/main" id="{DEE3DBA9-13E6-DC45-BDBA-98BB4BD2EFE3}"/>
+                <a16:creationId xmlns:a16="http://schemas.microsoft.com/office/drawing/2014/main" xmlns="" id="{DEE3DBA9-13E6-DC45-BDBA-98BB4BD2EFE3}"/>
               </a:ext>
             </a:extLst>
           </p:cNvPr>
@@ -351,7 +351,7 @@
           <p:cNvPr id="3" name="Date Placeholder 2">
             <a:extLst>
               <a:ext uri="{FF2B5EF4-FFF2-40B4-BE49-F238E27FC236}">
-                <a16:creationId xmlns="" xmlns:a16="http://schemas.microsoft.com/office/drawing/2014/main" id="{DB47A981-A150-F349-9F7E-0E8E0A0B9D07}"/>
+                <a16:creationId xmlns:a16="http://schemas.microsoft.com/office/drawing/2014/main" xmlns="" id="{DB47A981-A150-F349-9F7E-0E8E0A0B9D07}"/>
               </a:ext>
             </a:extLst>
           </p:cNvPr>
@@ -392,7 +392,7 @@
           <p:cNvPr id="4" name="Footer Placeholder 3">
             <a:extLst>
               <a:ext uri="{FF2B5EF4-FFF2-40B4-BE49-F238E27FC236}">
-                <a16:creationId xmlns="" xmlns:a16="http://schemas.microsoft.com/office/drawing/2014/main" id="{624D4072-1EDF-DE44-9B7B-0C0211BC80D3}"/>
+                <a16:creationId xmlns:a16="http://schemas.microsoft.com/office/drawing/2014/main" xmlns="" id="{624D4072-1EDF-DE44-9B7B-0C0211BC80D3}"/>
               </a:ext>
             </a:extLst>
           </p:cNvPr>
@@ -429,7 +429,7 @@
           <p:cNvPr id="5" name="Slide Number Placeholder 4">
             <a:extLst>
               <a:ext uri="{FF2B5EF4-FFF2-40B4-BE49-F238E27FC236}">
-                <a16:creationId xmlns="" xmlns:a16="http://schemas.microsoft.com/office/drawing/2014/main" id="{F0F3636E-DFDC-5C47-9485-3744BDD3CC23}"/>
+                <a16:creationId xmlns:a16="http://schemas.microsoft.com/office/drawing/2014/main" xmlns="" id="{F0F3636E-DFDC-5C47-9485-3744BDD3CC23}"/>
               </a:ext>
             </a:extLst>
           </p:cNvPr>
@@ -7252,15 +7252,7 @@
                   <a:schemeClr val="lt1"/>
                 </a:solidFill>
               </a:rPr>
-              <a:t>Dec 2</a:t>
-            </a:r>
-            <a:r>
-              <a:rPr lang="en-US" sz="2600" dirty="0" smtClean="0">
-                <a:solidFill>
-                  <a:schemeClr val="lt1"/>
-                </a:solidFill>
-              </a:rPr>
-              <a:t>, </a:t>
+              <a:t>Dec 2, </a:t>
             </a:r>
             <a:r>
               <a:rPr lang="en-US" sz="2600" dirty="0">
@@ -7600,56 +7592,56 @@
                 <a:gridCol w="2183446">
                   <a:extLst>
                     <a:ext uri="{9D8B030D-6E8A-4147-A177-3AD203B41FA5}">
-                      <a16:colId xmlns="" xmlns:a16="http://schemas.microsoft.com/office/drawing/2014/main" val="20000"/>
+                      <a16:colId xmlns:a16="http://schemas.microsoft.com/office/drawing/2014/main" xmlns="" val="20000"/>
                     </a:ext>
                   </a:extLst>
                 </a:gridCol>
                 <a:gridCol w="1207901">
                   <a:extLst>
                     <a:ext uri="{9D8B030D-6E8A-4147-A177-3AD203B41FA5}">
-                      <a16:colId xmlns="" xmlns:a16="http://schemas.microsoft.com/office/drawing/2014/main" val="20001"/>
+                      <a16:colId xmlns:a16="http://schemas.microsoft.com/office/drawing/2014/main" xmlns="" val="20001"/>
                     </a:ext>
                   </a:extLst>
                 </a:gridCol>
                 <a:gridCol w="1207901">
                   <a:extLst>
                     <a:ext uri="{9D8B030D-6E8A-4147-A177-3AD203B41FA5}">
-                      <a16:colId xmlns="" xmlns:a16="http://schemas.microsoft.com/office/drawing/2014/main" val="20002"/>
+                      <a16:colId xmlns:a16="http://schemas.microsoft.com/office/drawing/2014/main" xmlns="" val="20002"/>
                     </a:ext>
                   </a:extLst>
                 </a:gridCol>
                 <a:gridCol w="1207901">
                   <a:extLst>
                     <a:ext uri="{9D8B030D-6E8A-4147-A177-3AD203B41FA5}">
-                      <a16:colId xmlns="" xmlns:a16="http://schemas.microsoft.com/office/drawing/2014/main" val="20003"/>
+                      <a16:colId xmlns:a16="http://schemas.microsoft.com/office/drawing/2014/main" xmlns="" val="20003"/>
                     </a:ext>
                   </a:extLst>
                 </a:gridCol>
                 <a:gridCol w="1207901">
                   <a:extLst>
                     <a:ext uri="{9D8B030D-6E8A-4147-A177-3AD203B41FA5}">
-                      <a16:colId xmlns="" xmlns:a16="http://schemas.microsoft.com/office/drawing/2014/main" val="20004"/>
+                      <a16:colId xmlns:a16="http://schemas.microsoft.com/office/drawing/2014/main" xmlns="" val="20004"/>
                     </a:ext>
                   </a:extLst>
                 </a:gridCol>
                 <a:gridCol w="1207901">
                   <a:extLst>
                     <a:ext uri="{9D8B030D-6E8A-4147-A177-3AD203B41FA5}">
-                      <a16:colId xmlns="" xmlns:a16="http://schemas.microsoft.com/office/drawing/2014/main" val="20005"/>
+                      <a16:colId xmlns:a16="http://schemas.microsoft.com/office/drawing/2014/main" xmlns="" val="20005"/>
                     </a:ext>
                   </a:extLst>
                 </a:gridCol>
                 <a:gridCol w="1207901">
                   <a:extLst>
                     <a:ext uri="{9D8B030D-6E8A-4147-A177-3AD203B41FA5}">
-                      <a16:colId xmlns="" xmlns:a16="http://schemas.microsoft.com/office/drawing/2014/main" val="20006"/>
+                      <a16:colId xmlns:a16="http://schemas.microsoft.com/office/drawing/2014/main" xmlns="" val="20006"/>
                     </a:ext>
                   </a:extLst>
                 </a:gridCol>
                 <a:gridCol w="1207901">
                   <a:extLst>
                     <a:ext uri="{9D8B030D-6E8A-4147-A177-3AD203B41FA5}">
-                      <a16:colId xmlns="" xmlns:a16="http://schemas.microsoft.com/office/drawing/2014/main" val="20007"/>
+                      <a16:colId xmlns:a16="http://schemas.microsoft.com/office/drawing/2014/main" xmlns="" val="20007"/>
                     </a:ext>
                   </a:extLst>
                 </a:gridCol>
@@ -8238,7 +8230,7 @@
                 </a:tc>
                 <a:extLst>
                   <a:ext uri="{0D108BD9-81ED-4DB2-BD59-A6C34878D82A}">
-                    <a16:rowId xmlns="" xmlns:a16="http://schemas.microsoft.com/office/drawing/2014/main" val="10000"/>
+                    <a16:rowId xmlns:a16="http://schemas.microsoft.com/office/drawing/2014/main" xmlns="" val="10000"/>
                   </a:ext>
                 </a:extLst>
               </a:tr>
@@ -8805,7 +8797,7 @@
                 </a:tc>
                 <a:extLst>
                   <a:ext uri="{0D108BD9-81ED-4DB2-BD59-A6C34878D82A}">
-                    <a16:rowId xmlns="" xmlns:a16="http://schemas.microsoft.com/office/drawing/2014/main" val="10001"/>
+                    <a16:rowId xmlns:a16="http://schemas.microsoft.com/office/drawing/2014/main" xmlns="" val="10001"/>
                   </a:ext>
                 </a:extLst>
               </a:tr>
@@ -8840,7 +8832,7 @@
                 <a:gridCol w="3381300">
                   <a:extLst>
                     <a:ext uri="{9D8B030D-6E8A-4147-A177-3AD203B41FA5}">
-                      <a16:colId xmlns="" xmlns:a16="http://schemas.microsoft.com/office/drawing/2014/main" val="20000"/>
+                      <a16:colId xmlns:a16="http://schemas.microsoft.com/office/drawing/2014/main" xmlns="" val="20000"/>
                     </a:ext>
                   </a:extLst>
                 </a:gridCol>
@@ -8927,7 +8919,7 @@
                 </a:tc>
                 <a:extLst>
                   <a:ext uri="{0D108BD9-81ED-4DB2-BD59-A6C34878D82A}">
-                    <a16:rowId xmlns="" xmlns:a16="http://schemas.microsoft.com/office/drawing/2014/main" val="10000"/>
+                    <a16:rowId xmlns:a16="http://schemas.microsoft.com/office/drawing/2014/main" xmlns="" val="10000"/>
                   </a:ext>
                 </a:extLst>
               </a:tr>
@@ -8980,7 +8972,6 @@
                         <a:rPr lang="en-US" sz="1100" b="0" baseline="0" dirty="0" smtClean="0"/>
                         <a:t>Reviewed Sprint 0 (11/30 – 12/13) proposal. </a:t>
                       </a:r>
-                      <a:endParaRPr lang="en-US" sz="1100" b="0" baseline="0" dirty="0" smtClean="0"/>
                     </a:p>
                   </a:txBody>
                   <a:tcPr marL="63500" marR="63500" marT="63500" marB="63500">
@@ -9024,7 +9015,7 @@
                 </a:tc>
                 <a:extLst>
                   <a:ext uri="{0D108BD9-81ED-4DB2-BD59-A6C34878D82A}">
-                    <a16:rowId xmlns="" xmlns:a16="http://schemas.microsoft.com/office/drawing/2014/main" val="10001"/>
+                    <a16:rowId xmlns:a16="http://schemas.microsoft.com/office/drawing/2014/main" xmlns="" val="10001"/>
                   </a:ext>
                 </a:extLst>
               </a:tr>
@@ -9059,7 +9050,7 @@
                 <a:gridCol w="3381300">
                   <a:extLst>
                     <a:ext uri="{9D8B030D-6E8A-4147-A177-3AD203B41FA5}">
-                      <a16:colId xmlns="" xmlns:a16="http://schemas.microsoft.com/office/drawing/2014/main" val="20000"/>
+                      <a16:colId xmlns:a16="http://schemas.microsoft.com/office/drawing/2014/main" xmlns="" val="20000"/>
                     </a:ext>
                   </a:extLst>
                 </a:gridCol>
@@ -9138,7 +9129,7 @@
                 </a:tc>
                 <a:extLst>
                   <a:ext uri="{0D108BD9-81ED-4DB2-BD59-A6C34878D82A}">
-                    <a16:rowId xmlns="" xmlns:a16="http://schemas.microsoft.com/office/drawing/2014/main" val="10000"/>
+                    <a16:rowId xmlns:a16="http://schemas.microsoft.com/office/drawing/2014/main" xmlns="" val="10000"/>
                   </a:ext>
                 </a:extLst>
               </a:tr>
@@ -9322,7 +9313,6 @@
                         <a:rPr lang="en-US" sz="1100" baseline="0" dirty="0" smtClean="0"/>
                         <a:t> of issues resulting from technology upgrades</a:t>
                       </a:r>
-                      <a:endParaRPr lang="en-US" sz="1100" baseline="0" dirty="0" smtClean="0"/>
                     </a:p>
                   </a:txBody>
                   <a:tcPr marL="63500" marR="63500" marT="63500" marB="63500">
@@ -9366,7 +9356,7 @@
                 </a:tc>
                 <a:extLst>
                   <a:ext uri="{0D108BD9-81ED-4DB2-BD59-A6C34878D82A}">
-                    <a16:rowId xmlns="" xmlns:a16="http://schemas.microsoft.com/office/drawing/2014/main" val="10001"/>
+                    <a16:rowId xmlns:a16="http://schemas.microsoft.com/office/drawing/2014/main" xmlns="" val="10001"/>
                   </a:ext>
                 </a:extLst>
               </a:tr>
@@ -9401,7 +9391,7 @@
                 <a:gridCol w="3381300">
                   <a:extLst>
                     <a:ext uri="{9D8B030D-6E8A-4147-A177-3AD203B41FA5}">
-                      <a16:colId xmlns="" xmlns:a16="http://schemas.microsoft.com/office/drawing/2014/main" val="20000"/>
+                      <a16:colId xmlns:a16="http://schemas.microsoft.com/office/drawing/2014/main" xmlns="" val="20000"/>
                     </a:ext>
                   </a:extLst>
                 </a:gridCol>
@@ -9480,7 +9470,7 @@
                 </a:tc>
                 <a:extLst>
                   <a:ext uri="{0D108BD9-81ED-4DB2-BD59-A6C34878D82A}">
-                    <a16:rowId xmlns="" xmlns:a16="http://schemas.microsoft.com/office/drawing/2014/main" val="10000"/>
+                    <a16:rowId xmlns:a16="http://schemas.microsoft.com/office/drawing/2014/main" xmlns="" val="10000"/>
                   </a:ext>
                 </a:extLst>
               </a:tr>
@@ -9540,7 +9530,6 @@
                         <a:rPr lang="en-US" sz="1100" baseline="0" dirty="0" smtClean="0"/>
                         <a:t> (of which the QASP is a part).   </a:t>
                       </a:r>
-                      <a:endParaRPr lang="en-US" sz="1100" baseline="0" dirty="0" smtClean="0"/>
                     </a:p>
                   </a:txBody>
                   <a:tcPr marL="63500" marR="63500" marT="63500" marB="63500">
@@ -9584,7 +9573,7 @@
                 </a:tc>
                 <a:extLst>
                   <a:ext uri="{0D108BD9-81ED-4DB2-BD59-A6C34878D82A}">
-                    <a16:rowId xmlns="" xmlns:a16="http://schemas.microsoft.com/office/drawing/2014/main" val="10001"/>
+                    <a16:rowId xmlns:a16="http://schemas.microsoft.com/office/drawing/2014/main" xmlns="" val="10001"/>
                   </a:ext>
                 </a:extLst>
               </a:tr>
@@ -9698,56 +9687,56 @@
                 <a:gridCol w="2183446">
                   <a:extLst>
                     <a:ext uri="{9D8B030D-6E8A-4147-A177-3AD203B41FA5}">
-                      <a16:colId xmlns="" xmlns:a16="http://schemas.microsoft.com/office/drawing/2014/main" val="20000"/>
+                      <a16:colId xmlns:a16="http://schemas.microsoft.com/office/drawing/2014/main" xmlns="" val="20000"/>
                     </a:ext>
                   </a:extLst>
                 </a:gridCol>
                 <a:gridCol w="1207901">
                   <a:extLst>
                     <a:ext uri="{9D8B030D-6E8A-4147-A177-3AD203B41FA5}">
-                      <a16:colId xmlns="" xmlns:a16="http://schemas.microsoft.com/office/drawing/2014/main" val="20001"/>
+                      <a16:colId xmlns:a16="http://schemas.microsoft.com/office/drawing/2014/main" xmlns="" val="20001"/>
                     </a:ext>
                   </a:extLst>
                 </a:gridCol>
                 <a:gridCol w="1207901">
                   <a:extLst>
                     <a:ext uri="{9D8B030D-6E8A-4147-A177-3AD203B41FA5}">
-                      <a16:colId xmlns="" xmlns:a16="http://schemas.microsoft.com/office/drawing/2014/main" val="20002"/>
+                      <a16:colId xmlns:a16="http://schemas.microsoft.com/office/drawing/2014/main" xmlns="" val="20002"/>
                     </a:ext>
                   </a:extLst>
                 </a:gridCol>
                 <a:gridCol w="1207901">
                   <a:extLst>
                     <a:ext uri="{9D8B030D-6E8A-4147-A177-3AD203B41FA5}">
-                      <a16:colId xmlns="" xmlns:a16="http://schemas.microsoft.com/office/drawing/2014/main" val="20003"/>
+                      <a16:colId xmlns:a16="http://schemas.microsoft.com/office/drawing/2014/main" xmlns="" val="20003"/>
                     </a:ext>
                   </a:extLst>
                 </a:gridCol>
                 <a:gridCol w="1207901">
                   <a:extLst>
                     <a:ext uri="{9D8B030D-6E8A-4147-A177-3AD203B41FA5}">
-                      <a16:colId xmlns="" xmlns:a16="http://schemas.microsoft.com/office/drawing/2014/main" val="20004"/>
+                      <a16:colId xmlns:a16="http://schemas.microsoft.com/office/drawing/2014/main" xmlns="" val="20004"/>
                     </a:ext>
                   </a:extLst>
                 </a:gridCol>
                 <a:gridCol w="1207901">
                   <a:extLst>
                     <a:ext uri="{9D8B030D-6E8A-4147-A177-3AD203B41FA5}">
-                      <a16:colId xmlns="" xmlns:a16="http://schemas.microsoft.com/office/drawing/2014/main" val="20005"/>
+                      <a16:colId xmlns:a16="http://schemas.microsoft.com/office/drawing/2014/main" xmlns="" val="20005"/>
                     </a:ext>
                   </a:extLst>
                 </a:gridCol>
                 <a:gridCol w="1207901">
                   <a:extLst>
                     <a:ext uri="{9D8B030D-6E8A-4147-A177-3AD203B41FA5}">
-                      <a16:colId xmlns="" xmlns:a16="http://schemas.microsoft.com/office/drawing/2014/main" val="20006"/>
+                      <a16:colId xmlns:a16="http://schemas.microsoft.com/office/drawing/2014/main" xmlns="" val="20006"/>
                     </a:ext>
                   </a:extLst>
                 </a:gridCol>
                 <a:gridCol w="1207901">
                   <a:extLst>
                     <a:ext uri="{9D8B030D-6E8A-4147-A177-3AD203B41FA5}">
-                      <a16:colId xmlns="" xmlns:a16="http://schemas.microsoft.com/office/drawing/2014/main" val="20007"/>
+                      <a16:colId xmlns:a16="http://schemas.microsoft.com/office/drawing/2014/main" xmlns="" val="20007"/>
                     </a:ext>
                   </a:extLst>
                 </a:gridCol>
@@ -10336,7 +10325,7 @@
                 </a:tc>
                 <a:extLst>
                   <a:ext uri="{0D108BD9-81ED-4DB2-BD59-A6C34878D82A}">
-                    <a16:rowId xmlns="" xmlns:a16="http://schemas.microsoft.com/office/drawing/2014/main" val="10000"/>
+                    <a16:rowId xmlns:a16="http://schemas.microsoft.com/office/drawing/2014/main" xmlns="" val="10000"/>
                   </a:ext>
                 </a:extLst>
               </a:tr>
@@ -10903,7 +10892,7 @@
                 </a:tc>
                 <a:extLst>
                   <a:ext uri="{0D108BD9-81ED-4DB2-BD59-A6C34878D82A}">
-                    <a16:rowId xmlns="" xmlns:a16="http://schemas.microsoft.com/office/drawing/2014/main" val="10001"/>
+                    <a16:rowId xmlns:a16="http://schemas.microsoft.com/office/drawing/2014/main" xmlns="" val="10001"/>
                   </a:ext>
                 </a:extLst>
               </a:tr>
@@ -10938,7 +10927,7 @@
                 <a:gridCol w="3381300">
                   <a:extLst>
                     <a:ext uri="{9D8B030D-6E8A-4147-A177-3AD203B41FA5}">
-                      <a16:colId xmlns="" xmlns:a16="http://schemas.microsoft.com/office/drawing/2014/main" val="20000"/>
+                      <a16:colId xmlns:a16="http://schemas.microsoft.com/office/drawing/2014/main" xmlns="" val="20000"/>
                     </a:ext>
                   </a:extLst>
                 </a:gridCol>
@@ -11025,7 +11014,7 @@
                 </a:tc>
                 <a:extLst>
                   <a:ext uri="{0D108BD9-81ED-4DB2-BD59-A6C34878D82A}">
-                    <a16:rowId xmlns="" xmlns:a16="http://schemas.microsoft.com/office/drawing/2014/main" val="10000"/>
+                    <a16:rowId xmlns:a16="http://schemas.microsoft.com/office/drawing/2014/main" xmlns="" val="10000"/>
                   </a:ext>
                 </a:extLst>
               </a:tr>
@@ -11051,7 +11040,6 @@
                         <a:rPr lang="en-US" sz="1100" baseline="0" dirty="0" smtClean="0"/>
                         <a:t>Written acceptance on offers for Sr. Developer, UX Researcher, and QA Analyst. </a:t>
                       </a:r>
-                      <a:endParaRPr lang="en-US" sz="1100" baseline="0" dirty="0" smtClean="0"/>
                     </a:p>
                   </a:txBody>
                   <a:tcPr marL="63500" marR="63500" marT="63500" marB="63500">
@@ -11095,7 +11083,7 @@
                 </a:tc>
                 <a:extLst>
                   <a:ext uri="{0D108BD9-81ED-4DB2-BD59-A6C34878D82A}">
-                    <a16:rowId xmlns="" xmlns:a16="http://schemas.microsoft.com/office/drawing/2014/main" val="10001"/>
+                    <a16:rowId xmlns:a16="http://schemas.microsoft.com/office/drawing/2014/main" xmlns="" val="10001"/>
                   </a:ext>
                 </a:extLst>
               </a:tr>
@@ -11130,7 +11118,7 @@
                 <a:gridCol w="3381300">
                   <a:extLst>
                     <a:ext uri="{9D8B030D-6E8A-4147-A177-3AD203B41FA5}">
-                      <a16:colId xmlns="" xmlns:a16="http://schemas.microsoft.com/office/drawing/2014/main" val="20000"/>
+                      <a16:colId xmlns:a16="http://schemas.microsoft.com/office/drawing/2014/main" xmlns="" val="20000"/>
                     </a:ext>
                   </a:extLst>
                 </a:gridCol>
@@ -11209,7 +11197,7 @@
                 </a:tc>
                 <a:extLst>
                   <a:ext uri="{0D108BD9-81ED-4DB2-BD59-A6C34878D82A}">
-                    <a16:rowId xmlns="" xmlns:a16="http://schemas.microsoft.com/office/drawing/2014/main" val="10000"/>
+                    <a16:rowId xmlns:a16="http://schemas.microsoft.com/office/drawing/2014/main" xmlns="" val="10000"/>
                   </a:ext>
                 </a:extLst>
               </a:tr>
@@ -11233,21 +11221,8 @@
                       </a:pPr>
                       <a:r>
                         <a:rPr lang="en-US" sz="1100" baseline="0" dirty="0" smtClean="0"/>
-                        <a:t>Submit NDAs and OF306 for </a:t>
+                        <a:t>Submit NDAs and OF306 for Sr. Dev, UX Researcher, and QA Analyst. </a:t>
                       </a:r>
-                      <a:r>
-                        <a:rPr lang="en-US" sz="1100" baseline="0" dirty="0" smtClean="0"/>
-                        <a:t>Sr. Dev, UX Researcher, </a:t>
-                      </a:r>
-                      <a:r>
-                        <a:rPr lang="en-US" sz="1100" baseline="0" dirty="0" smtClean="0"/>
-                        <a:t>and </a:t>
-                      </a:r>
-                      <a:r>
-                        <a:rPr lang="en-US" sz="1100" baseline="0" dirty="0" smtClean="0"/>
-                        <a:t>QA Analyst. </a:t>
-                      </a:r>
-                      <a:endParaRPr lang="en-US" sz="1100" baseline="0" dirty="0" smtClean="0"/>
                     </a:p>
                     <a:p>
                       <a:pPr marL="115888" lvl="0" indent="-115888" algn="l" rtl="0">
@@ -11264,13 +11239,8 @@
                       </a:pPr>
                       <a:r>
                         <a:rPr lang="en-US" sz="1100" baseline="0" dirty="0" smtClean="0"/>
-                        <a:t>Continue staffing efforts for remaining developer </a:t>
+                        <a:t>Continue staffing efforts for remaining developer position. </a:t>
                       </a:r>
-                      <a:r>
-                        <a:rPr lang="en-US" sz="1100" baseline="0" dirty="0" smtClean="0"/>
-                        <a:t>position. </a:t>
-                      </a:r>
-                      <a:endParaRPr lang="en-US" sz="1100" baseline="0" dirty="0" smtClean="0"/>
                     </a:p>
                   </a:txBody>
                   <a:tcPr marL="63500" marR="63500" marT="63500" marB="63500">
@@ -11314,7 +11284,7 @@
                 </a:tc>
                 <a:extLst>
                   <a:ext uri="{0D108BD9-81ED-4DB2-BD59-A6C34878D82A}">
-                    <a16:rowId xmlns="" xmlns:a16="http://schemas.microsoft.com/office/drawing/2014/main" val="10001"/>
+                    <a16:rowId xmlns:a16="http://schemas.microsoft.com/office/drawing/2014/main" xmlns="" val="10001"/>
                   </a:ext>
                 </a:extLst>
               </a:tr>
@@ -11349,7 +11319,7 @@
                 <a:gridCol w="3381300">
                   <a:extLst>
                     <a:ext uri="{9D8B030D-6E8A-4147-A177-3AD203B41FA5}">
-                      <a16:colId xmlns="" xmlns:a16="http://schemas.microsoft.com/office/drawing/2014/main" val="20000"/>
+                      <a16:colId xmlns:a16="http://schemas.microsoft.com/office/drawing/2014/main" xmlns="" val="20000"/>
                     </a:ext>
                   </a:extLst>
                 </a:gridCol>
@@ -11428,7 +11398,7 @@
                 </a:tc>
                 <a:extLst>
                   <a:ext uri="{0D108BD9-81ED-4DB2-BD59-A6C34878D82A}">
-                    <a16:rowId xmlns="" xmlns:a16="http://schemas.microsoft.com/office/drawing/2014/main" val="10000"/>
+                    <a16:rowId xmlns:a16="http://schemas.microsoft.com/office/drawing/2014/main" xmlns="" val="10000"/>
                   </a:ext>
                 </a:extLst>
               </a:tr>
@@ -11558,7 +11528,7 @@
                 </a:tc>
                 <a:extLst>
                   <a:ext uri="{0D108BD9-81ED-4DB2-BD59-A6C34878D82A}">
-                    <a16:rowId xmlns="" xmlns:a16="http://schemas.microsoft.com/office/drawing/2014/main" val="10001"/>
+                    <a16:rowId xmlns:a16="http://schemas.microsoft.com/office/drawing/2014/main" xmlns="" val="10001"/>
                   </a:ext>
                 </a:extLst>
               </a:tr>
@@ -11672,56 +11642,56 @@
                 <a:gridCol w="2173603">
                   <a:extLst>
                     <a:ext uri="{9D8B030D-6E8A-4147-A177-3AD203B41FA5}">
-                      <a16:colId xmlns="" xmlns:a16="http://schemas.microsoft.com/office/drawing/2014/main" val="20000"/>
+                      <a16:colId xmlns:a16="http://schemas.microsoft.com/office/drawing/2014/main" xmlns="" val="20000"/>
                     </a:ext>
                   </a:extLst>
                 </a:gridCol>
                 <a:gridCol w="1202455">
                   <a:extLst>
                     <a:ext uri="{9D8B030D-6E8A-4147-A177-3AD203B41FA5}">
-                      <a16:colId xmlns="" xmlns:a16="http://schemas.microsoft.com/office/drawing/2014/main" val="20001"/>
+                      <a16:colId xmlns:a16="http://schemas.microsoft.com/office/drawing/2014/main" xmlns="" val="20001"/>
                     </a:ext>
                   </a:extLst>
                 </a:gridCol>
                 <a:gridCol w="1202455">
                   <a:extLst>
                     <a:ext uri="{9D8B030D-6E8A-4147-A177-3AD203B41FA5}">
-                      <a16:colId xmlns="" xmlns:a16="http://schemas.microsoft.com/office/drawing/2014/main" val="20002"/>
+                      <a16:colId xmlns:a16="http://schemas.microsoft.com/office/drawing/2014/main" xmlns="" val="20002"/>
                     </a:ext>
                   </a:extLst>
                 </a:gridCol>
                 <a:gridCol w="1202455">
                   <a:extLst>
                     <a:ext uri="{9D8B030D-6E8A-4147-A177-3AD203B41FA5}">
-                      <a16:colId xmlns="" xmlns:a16="http://schemas.microsoft.com/office/drawing/2014/main" val="20003"/>
+                      <a16:colId xmlns:a16="http://schemas.microsoft.com/office/drawing/2014/main" xmlns="" val="20003"/>
                     </a:ext>
                   </a:extLst>
                 </a:gridCol>
                 <a:gridCol w="1202455">
                   <a:extLst>
                     <a:ext uri="{9D8B030D-6E8A-4147-A177-3AD203B41FA5}">
-                      <a16:colId xmlns="" xmlns:a16="http://schemas.microsoft.com/office/drawing/2014/main" val="20004"/>
+                      <a16:colId xmlns:a16="http://schemas.microsoft.com/office/drawing/2014/main" xmlns="" val="20004"/>
                     </a:ext>
                   </a:extLst>
                 </a:gridCol>
                 <a:gridCol w="1202455">
                   <a:extLst>
                     <a:ext uri="{9D8B030D-6E8A-4147-A177-3AD203B41FA5}">
-                      <a16:colId xmlns="" xmlns:a16="http://schemas.microsoft.com/office/drawing/2014/main" val="20005"/>
+                      <a16:colId xmlns:a16="http://schemas.microsoft.com/office/drawing/2014/main" xmlns="" val="20005"/>
                     </a:ext>
                   </a:extLst>
                 </a:gridCol>
                 <a:gridCol w="1202455">
                   <a:extLst>
                     <a:ext uri="{9D8B030D-6E8A-4147-A177-3AD203B41FA5}">
-                      <a16:colId xmlns="" xmlns:a16="http://schemas.microsoft.com/office/drawing/2014/main" val="20006"/>
+                      <a16:colId xmlns:a16="http://schemas.microsoft.com/office/drawing/2014/main" xmlns="" val="20006"/>
                     </a:ext>
                   </a:extLst>
                 </a:gridCol>
                 <a:gridCol w="1202455">
                   <a:extLst>
                     <a:ext uri="{9D8B030D-6E8A-4147-A177-3AD203B41FA5}">
-                      <a16:colId xmlns="" xmlns:a16="http://schemas.microsoft.com/office/drawing/2014/main" val="20007"/>
+                      <a16:colId xmlns:a16="http://schemas.microsoft.com/office/drawing/2014/main" xmlns="" val="20007"/>
                     </a:ext>
                   </a:extLst>
                 </a:gridCol>
@@ -12310,7 +12280,7 @@
                 </a:tc>
                 <a:extLst>
                   <a:ext uri="{0D108BD9-81ED-4DB2-BD59-A6C34878D82A}">
-                    <a16:rowId xmlns="" xmlns:a16="http://schemas.microsoft.com/office/drawing/2014/main" val="10000"/>
+                    <a16:rowId xmlns:a16="http://schemas.microsoft.com/office/drawing/2014/main" xmlns="" val="10000"/>
                   </a:ext>
                 </a:extLst>
               </a:tr>
@@ -12885,7 +12855,7 @@
                 </a:tc>
                 <a:extLst>
                   <a:ext uri="{0D108BD9-81ED-4DB2-BD59-A6C34878D82A}">
-                    <a16:rowId xmlns="" xmlns:a16="http://schemas.microsoft.com/office/drawing/2014/main" val="10001"/>
+                    <a16:rowId xmlns:a16="http://schemas.microsoft.com/office/drawing/2014/main" xmlns="" val="10001"/>
                   </a:ext>
                 </a:extLst>
               </a:tr>
@@ -12920,7 +12890,7 @@
                 <a:gridCol w="3381300">
                   <a:extLst>
                     <a:ext uri="{9D8B030D-6E8A-4147-A177-3AD203B41FA5}">
-                      <a16:colId xmlns="" xmlns:a16="http://schemas.microsoft.com/office/drawing/2014/main" val="20000"/>
+                      <a16:colId xmlns:a16="http://schemas.microsoft.com/office/drawing/2014/main" xmlns="" val="20000"/>
                     </a:ext>
                   </a:extLst>
                 </a:gridCol>
@@ -13007,7 +12977,7 @@
                 </a:tc>
                 <a:extLst>
                   <a:ext uri="{0D108BD9-81ED-4DB2-BD59-A6C34878D82A}">
-                    <a16:rowId xmlns="" xmlns:a16="http://schemas.microsoft.com/office/drawing/2014/main" val="10000"/>
+                    <a16:rowId xmlns:a16="http://schemas.microsoft.com/office/drawing/2014/main" xmlns="" val="10000"/>
                   </a:ext>
                 </a:extLst>
               </a:tr>
@@ -13051,7 +13021,6 @@
                         <a:rPr lang="en-US" sz="1100" baseline="0" dirty="0" smtClean="0"/>
                         <a:t>Submitted rate schedule.</a:t>
                       </a:r>
-                      <a:endParaRPr lang="en-US" sz="1100" baseline="0" dirty="0" smtClean="0"/>
                     </a:p>
                   </a:txBody>
                   <a:tcPr marL="63500" marR="63500" marT="63500" marB="63500">
@@ -13095,7 +13064,7 @@
                 </a:tc>
                 <a:extLst>
                   <a:ext uri="{0D108BD9-81ED-4DB2-BD59-A6C34878D82A}">
-                    <a16:rowId xmlns="" xmlns:a16="http://schemas.microsoft.com/office/drawing/2014/main" val="10001"/>
+                    <a16:rowId xmlns:a16="http://schemas.microsoft.com/office/drawing/2014/main" xmlns="" val="10001"/>
                   </a:ext>
                 </a:extLst>
               </a:tr>
@@ -13130,7 +13099,7 @@
                 <a:gridCol w="3381300">
                   <a:extLst>
                     <a:ext uri="{9D8B030D-6E8A-4147-A177-3AD203B41FA5}">
-                      <a16:colId xmlns="" xmlns:a16="http://schemas.microsoft.com/office/drawing/2014/main" val="20000"/>
+                      <a16:colId xmlns:a16="http://schemas.microsoft.com/office/drawing/2014/main" xmlns="" val="20000"/>
                     </a:ext>
                   </a:extLst>
                 </a:gridCol>
@@ -13209,7 +13178,7 @@
                 </a:tc>
                 <a:extLst>
                   <a:ext uri="{0D108BD9-81ED-4DB2-BD59-A6C34878D82A}">
-                    <a16:rowId xmlns="" xmlns:a16="http://schemas.microsoft.com/office/drawing/2014/main" val="10000"/>
+                    <a16:rowId xmlns:a16="http://schemas.microsoft.com/office/drawing/2014/main" xmlns="" val="10000"/>
                   </a:ext>
                 </a:extLst>
               </a:tr>
@@ -13324,7 +13293,7 @@
                 </a:tc>
                 <a:extLst>
                   <a:ext uri="{0D108BD9-81ED-4DB2-BD59-A6C34878D82A}">
-                    <a16:rowId xmlns="" xmlns:a16="http://schemas.microsoft.com/office/drawing/2014/main" val="10001"/>
+                    <a16:rowId xmlns:a16="http://schemas.microsoft.com/office/drawing/2014/main" xmlns="" val="10001"/>
                   </a:ext>
                 </a:extLst>
               </a:tr>
@@ -13339,14 +13308,14 @@
           <p:nvPr>
             <p:extLst>
               <p:ext uri="{D42A27DB-BD31-4B8C-83A1-F6EECF244321}">
-                <p14:modId xmlns:p14="http://schemas.microsoft.com/office/powerpoint/2010/main" val="529445114"/>
+                <p14:modId xmlns:p14="http://schemas.microsoft.com/office/powerpoint/2010/main" val="192291857"/>
               </p:ext>
             </p:extLst>
           </p:nvPr>
         </p:nvGraphicFramePr>
         <p:xfrm>
           <a:off x="8177725" y="2546175"/>
-          <a:ext cx="3381300" cy="3333850"/>
+          <a:ext cx="3381300" cy="3529275"/>
         </p:xfrm>
         <a:graphic>
           <a:graphicData uri="http://schemas.openxmlformats.org/drawingml/2006/table">
@@ -13359,7 +13328,7 @@
                 <a:gridCol w="3381300">
                   <a:extLst>
                     <a:ext uri="{9D8B030D-6E8A-4147-A177-3AD203B41FA5}">
-                      <a16:colId xmlns="" xmlns:a16="http://schemas.microsoft.com/office/drawing/2014/main" val="20000"/>
+                      <a16:colId xmlns:a16="http://schemas.microsoft.com/office/drawing/2014/main" xmlns="" val="20000"/>
                     </a:ext>
                   </a:extLst>
                 </a:gridCol>
@@ -13438,7 +13407,7 @@
                 </a:tc>
                 <a:extLst>
                   <a:ext uri="{0D108BD9-81ED-4DB2-BD59-A6C34878D82A}">
-                    <a16:rowId xmlns="" xmlns:a16="http://schemas.microsoft.com/office/drawing/2014/main" val="10000"/>
+                    <a16:rowId xmlns:a16="http://schemas.microsoft.com/office/drawing/2014/main" xmlns="" val="10000"/>
                   </a:ext>
                 </a:extLst>
               </a:tr>
@@ -13514,7 +13483,6 @@
                         <a:rPr lang="en-US" sz="1100" baseline="0" dirty="0" smtClean="0"/>
                         <a:t>Sprint report for this sprint? (Assumption: Sprint report is typically generated from the tool.)</a:t>
                       </a:r>
-                      <a:endParaRPr lang="en-US" sz="1100" baseline="0" dirty="0" smtClean="0"/>
                     </a:p>
                     <a:p>
                       <a:pPr marL="171450" marR="0" lvl="0" indent="-171450" algn="l" defTabSz="914400" rtl="0" eaLnBrk="1" fontAlgn="auto" latinLnBrk="0" hangingPunct="1">
@@ -13580,6 +13548,75 @@
                       </a:r>
                     </a:p>
                     <a:p>
+                      <a:pPr marL="171450" marR="0" lvl="0" indent="-171450" algn="l" defTabSz="914400" rtl="0" eaLnBrk="1" fontAlgn="auto" latinLnBrk="0" hangingPunct="1">
+                        <a:lnSpc>
+                          <a:spcPct val="100000"/>
+                        </a:lnSpc>
+                        <a:spcBef>
+                          <a:spcPts val="0"/>
+                        </a:spcBef>
+                        <a:spcAft>
+                          <a:spcPts val="600"/>
+                        </a:spcAft>
+                        <a:buClr>
+                          <a:srgbClr val="000000"/>
+                        </a:buClr>
+                        <a:buSzPts val="1100"/>
+                        <a:buFont typeface="Arial" panose="020B0604020202020204" pitchFamily="34" charset="0"/>
+                        <a:buChar char="•"/>
+                        <a:tabLst/>
+                        <a:defRPr/>
+                      </a:pPr>
+                      <a:r>
+                        <a:rPr kumimoji="0" lang="en-US" sz="1100" b="0" i="0" u="none" strike="noStrike" kern="0" cap="none" spc="0" normalizeH="0" baseline="0" noProof="0" dirty="0" smtClean="0">
+                          <a:ln>
+                            <a:noFill/>
+                          </a:ln>
+                          <a:solidFill>
+                            <a:srgbClr val="000000"/>
+                          </a:solidFill>
+                          <a:effectLst/>
+                          <a:uLnTx/>
+                          <a:uFillTx/>
+                          <a:latin typeface="Arial"/>
+                          <a:cs typeface="Arial"/>
+                          <a:sym typeface="Arial"/>
+                        </a:rPr>
+                        <a:t>Government shutdown: Will the team be able to continue working on the tasks defined for Sprint 0? If so, who will be the FEC POC </a:t>
+                      </a:r>
+                      <a:r>
+                        <a:rPr kumimoji="0" lang="en-US" sz="1100" b="0" i="0" u="none" strike="noStrike" kern="0" cap="none" spc="0" normalizeH="0" baseline="0" noProof="0" smtClean="0">
+                          <a:ln>
+                            <a:noFill/>
+                          </a:ln>
+                          <a:solidFill>
+                            <a:srgbClr val="000000"/>
+                          </a:solidFill>
+                          <a:effectLst/>
+                          <a:uLnTx/>
+                          <a:uFillTx/>
+                          <a:latin typeface="Arial"/>
+                          <a:cs typeface="Arial"/>
+                          <a:sym typeface="Arial"/>
+                        </a:rPr>
+                        <a:t>during that time? </a:t>
+                      </a:r>
+                      <a:endParaRPr kumimoji="0" lang="en-US" sz="1100" b="0" i="0" u="none" strike="noStrike" kern="0" cap="none" spc="0" normalizeH="0" baseline="0" noProof="0" dirty="0" smtClean="0">
+                        <a:ln>
+                          <a:noFill/>
+                        </a:ln>
+                        <a:solidFill>
+                          <a:srgbClr val="000000"/>
+                        </a:solidFill>
+                        <a:effectLst/>
+                        <a:uLnTx/>
+                        <a:uFillTx/>
+                        <a:latin typeface="Arial"/>
+                        <a:cs typeface="Arial"/>
+                        <a:sym typeface="Arial"/>
+                      </a:endParaRPr>
+                    </a:p>
+                    <a:p>
                       <a:pPr marL="0" marR="0" lvl="0" indent="0" algn="l" defTabSz="914400" rtl="0" eaLnBrk="1" fontAlgn="auto" latinLnBrk="0" hangingPunct="1">
                         <a:lnSpc>
                           <a:spcPct val="100000"/>
@@ -13643,7 +13680,7 @@
                 </a:tc>
                 <a:extLst>
                   <a:ext uri="{0D108BD9-81ED-4DB2-BD59-A6C34878D82A}">
-                    <a16:rowId xmlns="" xmlns:a16="http://schemas.microsoft.com/office/drawing/2014/main" val="10001"/>
+                    <a16:rowId xmlns:a16="http://schemas.microsoft.com/office/drawing/2014/main" xmlns="" val="10001"/>
                   </a:ext>
                 </a:extLst>
               </a:tr>
@@ -13761,42 +13798,42 @@
                 <a:gridCol w="2623482">
                   <a:extLst>
                     <a:ext uri="{9D8B030D-6E8A-4147-A177-3AD203B41FA5}">
-                      <a16:colId xmlns="" xmlns:a16="http://schemas.microsoft.com/office/drawing/2014/main" val="20000"/>
+                      <a16:colId xmlns:a16="http://schemas.microsoft.com/office/drawing/2014/main" xmlns="" val="20000"/>
                     </a:ext>
                   </a:extLst>
                 </a:gridCol>
                 <a:gridCol w="813627">
                   <a:extLst>
                     <a:ext uri="{9D8B030D-6E8A-4147-A177-3AD203B41FA5}">
-                      <a16:colId xmlns="" xmlns:a16="http://schemas.microsoft.com/office/drawing/2014/main" val="20001"/>
+                      <a16:colId xmlns:a16="http://schemas.microsoft.com/office/drawing/2014/main" xmlns="" val="20001"/>
                     </a:ext>
                   </a:extLst>
                 </a:gridCol>
                 <a:gridCol w="1348902">
                   <a:extLst>
                     <a:ext uri="{9D8B030D-6E8A-4147-A177-3AD203B41FA5}">
-                      <a16:colId xmlns="" xmlns:a16="http://schemas.microsoft.com/office/drawing/2014/main" val="20002"/>
+                      <a16:colId xmlns:a16="http://schemas.microsoft.com/office/drawing/2014/main" xmlns="" val="20002"/>
                     </a:ext>
                   </a:extLst>
                 </a:gridCol>
                 <a:gridCol w="1167319">
                   <a:extLst>
                     <a:ext uri="{9D8B030D-6E8A-4147-A177-3AD203B41FA5}">
-                      <a16:colId xmlns="" xmlns:a16="http://schemas.microsoft.com/office/drawing/2014/main" val="20003"/>
+                      <a16:colId xmlns:a16="http://schemas.microsoft.com/office/drawing/2014/main" xmlns="" val="20003"/>
                     </a:ext>
                   </a:extLst>
                 </a:gridCol>
                 <a:gridCol w="3891064">
                   <a:extLst>
                     <a:ext uri="{9D8B030D-6E8A-4147-A177-3AD203B41FA5}">
-                      <a16:colId xmlns="" xmlns:a16="http://schemas.microsoft.com/office/drawing/2014/main" val="20004"/>
+                      <a16:colId xmlns:a16="http://schemas.microsoft.com/office/drawing/2014/main" xmlns="" val="20004"/>
                     </a:ext>
                   </a:extLst>
                 </a:gridCol>
                 <a:gridCol w="1348901">
                   <a:extLst>
                     <a:ext uri="{9D8B030D-6E8A-4147-A177-3AD203B41FA5}">
-                      <a16:colId xmlns="" xmlns:a16="http://schemas.microsoft.com/office/drawing/2014/main" val="20005"/>
+                      <a16:colId xmlns:a16="http://schemas.microsoft.com/office/drawing/2014/main" xmlns="" val="20005"/>
                     </a:ext>
                   </a:extLst>
                 </a:gridCol>
@@ -14256,7 +14293,7 @@
                 </a:tc>
                 <a:extLst>
                   <a:ext uri="{0D108BD9-81ED-4DB2-BD59-A6C34878D82A}">
-                    <a16:rowId xmlns="" xmlns:a16="http://schemas.microsoft.com/office/drawing/2014/main" val="10000"/>
+                    <a16:rowId xmlns:a16="http://schemas.microsoft.com/office/drawing/2014/main" xmlns="" val="10000"/>
                   </a:ext>
                 </a:extLst>
               </a:tr>
@@ -14699,7 +14736,7 @@
                 </a:tc>
                 <a:extLst>
                   <a:ext uri="{0D108BD9-81ED-4DB2-BD59-A6C34878D82A}">
-                    <a16:rowId xmlns="" xmlns:a16="http://schemas.microsoft.com/office/drawing/2014/main" val="10001"/>
+                    <a16:rowId xmlns:a16="http://schemas.microsoft.com/office/drawing/2014/main" xmlns="" val="10001"/>
                   </a:ext>
                 </a:extLst>
               </a:tr>
@@ -15094,7 +15131,7 @@
                 </a:tc>
                 <a:extLst>
                   <a:ext uri="{0D108BD9-81ED-4DB2-BD59-A6C34878D82A}">
-                    <a16:rowId xmlns="" xmlns:a16="http://schemas.microsoft.com/office/drawing/2014/main" val="10003"/>
+                    <a16:rowId xmlns:a16="http://schemas.microsoft.com/office/drawing/2014/main" xmlns="" val="10003"/>
                   </a:ext>
                 </a:extLst>
               </a:tr>
@@ -15457,7 +15494,7 @@
                 </a:tc>
                 <a:extLst>
                   <a:ext uri="{0D108BD9-81ED-4DB2-BD59-A6C34878D82A}">
-                    <a16:rowId xmlns="" xmlns:a16="http://schemas.microsoft.com/office/drawing/2014/main" val="3646535492"/>
+                    <a16:rowId xmlns:a16="http://schemas.microsoft.com/office/drawing/2014/main" xmlns="" val="3646535492"/>
                   </a:ext>
                 </a:extLst>
               </a:tr>
@@ -15820,7 +15857,7 @@
                 </a:tc>
                 <a:extLst>
                   <a:ext uri="{0D108BD9-81ED-4DB2-BD59-A6C34878D82A}">
-                    <a16:rowId xmlns="" xmlns:a16="http://schemas.microsoft.com/office/drawing/2014/main" val="376521511"/>
+                    <a16:rowId xmlns:a16="http://schemas.microsoft.com/office/drawing/2014/main" xmlns="" val="376521511"/>
                   </a:ext>
                 </a:extLst>
               </a:tr>
@@ -16018,28 +16055,28 @@
                 <a:gridCol w="1052956">
                   <a:extLst>
                     <a:ext uri="{9D8B030D-6E8A-4147-A177-3AD203B41FA5}">
-                      <a16:colId xmlns="" xmlns:a16="http://schemas.microsoft.com/office/drawing/2014/main" val="20000"/>
+                      <a16:colId xmlns:a16="http://schemas.microsoft.com/office/drawing/2014/main" xmlns="" val="20000"/>
                     </a:ext>
                   </a:extLst>
                 </a:gridCol>
                 <a:gridCol w="3114471">
                   <a:extLst>
                     <a:ext uri="{9D8B030D-6E8A-4147-A177-3AD203B41FA5}">
-                      <a16:colId xmlns="" xmlns:a16="http://schemas.microsoft.com/office/drawing/2014/main" val="20001"/>
+                      <a16:colId xmlns:a16="http://schemas.microsoft.com/office/drawing/2014/main" xmlns="" val="20001"/>
                     </a:ext>
                   </a:extLst>
                 </a:gridCol>
                 <a:gridCol w="3114471">
                   <a:extLst>
                     <a:ext uri="{9D8B030D-6E8A-4147-A177-3AD203B41FA5}">
-                      <a16:colId xmlns="" xmlns:a16="http://schemas.microsoft.com/office/drawing/2014/main" val="20002"/>
+                      <a16:colId xmlns:a16="http://schemas.microsoft.com/office/drawing/2014/main" xmlns="" val="20002"/>
                     </a:ext>
                   </a:extLst>
                 </a:gridCol>
                 <a:gridCol w="3114471">
                   <a:extLst>
                     <a:ext uri="{9D8B030D-6E8A-4147-A177-3AD203B41FA5}">
-                      <a16:colId xmlns="" xmlns:a16="http://schemas.microsoft.com/office/drawing/2014/main" val="20003"/>
+                      <a16:colId xmlns:a16="http://schemas.microsoft.com/office/drawing/2014/main" xmlns="" val="20003"/>
                     </a:ext>
                   </a:extLst>
                 </a:gridCol>
@@ -16336,7 +16373,7 @@
                 </a:tc>
                 <a:extLst>
                   <a:ext uri="{0D108BD9-81ED-4DB2-BD59-A6C34878D82A}">
-                    <a16:rowId xmlns="" xmlns:a16="http://schemas.microsoft.com/office/drawing/2014/main" val="10000"/>
+                    <a16:rowId xmlns:a16="http://schemas.microsoft.com/office/drawing/2014/main" xmlns="" val="10000"/>
                   </a:ext>
                 </a:extLst>
               </a:tr>
@@ -16598,7 +16635,7 @@
                 </a:tc>
                 <a:extLst>
                   <a:ext uri="{0D108BD9-81ED-4DB2-BD59-A6C34878D82A}">
-                    <a16:rowId xmlns="" xmlns:a16="http://schemas.microsoft.com/office/drawing/2014/main" val="10001"/>
+                    <a16:rowId xmlns:a16="http://schemas.microsoft.com/office/drawing/2014/main" xmlns="" val="10001"/>
                   </a:ext>
                 </a:extLst>
               </a:tr>
@@ -17268,7 +17305,7 @@
                 </a:tc>
                 <a:extLst>
                   <a:ext uri="{0D108BD9-81ED-4DB2-BD59-A6C34878D82A}">
-                    <a16:rowId xmlns="" xmlns:a16="http://schemas.microsoft.com/office/drawing/2014/main" val="10002"/>
+                    <a16:rowId xmlns:a16="http://schemas.microsoft.com/office/drawing/2014/main" xmlns="" val="10002"/>
                   </a:ext>
                 </a:extLst>
               </a:tr>
@@ -17542,7 +17579,7 @@
                 </a:tc>
                 <a:extLst>
                   <a:ext uri="{0D108BD9-81ED-4DB2-BD59-A6C34878D82A}">
-                    <a16:rowId xmlns="" xmlns:a16="http://schemas.microsoft.com/office/drawing/2014/main" val="10003"/>
+                    <a16:rowId xmlns:a16="http://schemas.microsoft.com/office/drawing/2014/main" xmlns="" val="10003"/>
                   </a:ext>
                 </a:extLst>
               </a:tr>

</xml_diff>

<commit_message>
Uploading meeting notes and updated presentation
</commit_message>
<xml_diff>
--- a/MeetingNotes/2021-12-02 FEC - FECFile Online - Weekly Check-in.pptx
+++ b/MeetingNotes/2021-12-02 FEC - FECFile Online - Weekly Check-in.pptx
@@ -314,7 +314,7 @@
           <p:cNvPr id="2" name="Header Placeholder 1">
             <a:extLst>
               <a:ext uri="{FF2B5EF4-FFF2-40B4-BE49-F238E27FC236}">
-                <a16:creationId xmlns:a16="http://schemas.microsoft.com/office/drawing/2014/main" xmlns="" id="{DEE3DBA9-13E6-DC45-BDBA-98BB4BD2EFE3}"/>
+                <a16:creationId xmlns="" xmlns:a16="http://schemas.microsoft.com/office/drawing/2014/main" id="{DEE3DBA9-13E6-DC45-BDBA-98BB4BD2EFE3}"/>
               </a:ext>
             </a:extLst>
           </p:cNvPr>
@@ -351,7 +351,7 @@
           <p:cNvPr id="3" name="Date Placeholder 2">
             <a:extLst>
               <a:ext uri="{FF2B5EF4-FFF2-40B4-BE49-F238E27FC236}">
-                <a16:creationId xmlns:a16="http://schemas.microsoft.com/office/drawing/2014/main" xmlns="" id="{DB47A981-A150-F349-9F7E-0E8E0A0B9D07}"/>
+                <a16:creationId xmlns="" xmlns:a16="http://schemas.microsoft.com/office/drawing/2014/main" id="{DB47A981-A150-F349-9F7E-0E8E0A0B9D07}"/>
               </a:ext>
             </a:extLst>
           </p:cNvPr>
@@ -392,7 +392,7 @@
           <p:cNvPr id="4" name="Footer Placeholder 3">
             <a:extLst>
               <a:ext uri="{FF2B5EF4-FFF2-40B4-BE49-F238E27FC236}">
-                <a16:creationId xmlns:a16="http://schemas.microsoft.com/office/drawing/2014/main" xmlns="" id="{624D4072-1EDF-DE44-9B7B-0C0211BC80D3}"/>
+                <a16:creationId xmlns="" xmlns:a16="http://schemas.microsoft.com/office/drawing/2014/main" id="{624D4072-1EDF-DE44-9B7B-0C0211BC80D3}"/>
               </a:ext>
             </a:extLst>
           </p:cNvPr>
@@ -429,7 +429,7 @@
           <p:cNvPr id="5" name="Slide Number Placeholder 4">
             <a:extLst>
               <a:ext uri="{FF2B5EF4-FFF2-40B4-BE49-F238E27FC236}">
-                <a16:creationId xmlns:a16="http://schemas.microsoft.com/office/drawing/2014/main" xmlns="" id="{F0F3636E-DFDC-5C47-9485-3744BDD3CC23}"/>
+                <a16:creationId xmlns="" xmlns:a16="http://schemas.microsoft.com/office/drawing/2014/main" id="{F0F3636E-DFDC-5C47-9485-3744BDD3CC23}"/>
               </a:ext>
             </a:extLst>
           </p:cNvPr>
@@ -7592,56 +7592,56 @@
                 <a:gridCol w="2183446">
                   <a:extLst>
                     <a:ext uri="{9D8B030D-6E8A-4147-A177-3AD203B41FA5}">
-                      <a16:colId xmlns:a16="http://schemas.microsoft.com/office/drawing/2014/main" xmlns="" val="20000"/>
+                      <a16:colId xmlns="" xmlns:a16="http://schemas.microsoft.com/office/drawing/2014/main" val="20000"/>
                     </a:ext>
                   </a:extLst>
                 </a:gridCol>
                 <a:gridCol w="1207901">
                   <a:extLst>
                     <a:ext uri="{9D8B030D-6E8A-4147-A177-3AD203B41FA5}">
-                      <a16:colId xmlns:a16="http://schemas.microsoft.com/office/drawing/2014/main" xmlns="" val="20001"/>
+                      <a16:colId xmlns="" xmlns:a16="http://schemas.microsoft.com/office/drawing/2014/main" val="20001"/>
                     </a:ext>
                   </a:extLst>
                 </a:gridCol>
                 <a:gridCol w="1207901">
                   <a:extLst>
                     <a:ext uri="{9D8B030D-6E8A-4147-A177-3AD203B41FA5}">
-                      <a16:colId xmlns:a16="http://schemas.microsoft.com/office/drawing/2014/main" xmlns="" val="20002"/>
+                      <a16:colId xmlns="" xmlns:a16="http://schemas.microsoft.com/office/drawing/2014/main" val="20002"/>
                     </a:ext>
                   </a:extLst>
                 </a:gridCol>
                 <a:gridCol w="1207901">
                   <a:extLst>
                     <a:ext uri="{9D8B030D-6E8A-4147-A177-3AD203B41FA5}">
-                      <a16:colId xmlns:a16="http://schemas.microsoft.com/office/drawing/2014/main" xmlns="" val="20003"/>
+                      <a16:colId xmlns="" xmlns:a16="http://schemas.microsoft.com/office/drawing/2014/main" val="20003"/>
                     </a:ext>
                   </a:extLst>
                 </a:gridCol>
                 <a:gridCol w="1207901">
                   <a:extLst>
                     <a:ext uri="{9D8B030D-6E8A-4147-A177-3AD203B41FA5}">
-                      <a16:colId xmlns:a16="http://schemas.microsoft.com/office/drawing/2014/main" xmlns="" val="20004"/>
+                      <a16:colId xmlns="" xmlns:a16="http://schemas.microsoft.com/office/drawing/2014/main" val="20004"/>
                     </a:ext>
                   </a:extLst>
                 </a:gridCol>
                 <a:gridCol w="1207901">
                   <a:extLst>
                     <a:ext uri="{9D8B030D-6E8A-4147-A177-3AD203B41FA5}">
-                      <a16:colId xmlns:a16="http://schemas.microsoft.com/office/drawing/2014/main" xmlns="" val="20005"/>
+                      <a16:colId xmlns="" xmlns:a16="http://schemas.microsoft.com/office/drawing/2014/main" val="20005"/>
                     </a:ext>
                   </a:extLst>
                 </a:gridCol>
                 <a:gridCol w="1207901">
                   <a:extLst>
                     <a:ext uri="{9D8B030D-6E8A-4147-A177-3AD203B41FA5}">
-                      <a16:colId xmlns:a16="http://schemas.microsoft.com/office/drawing/2014/main" xmlns="" val="20006"/>
+                      <a16:colId xmlns="" xmlns:a16="http://schemas.microsoft.com/office/drawing/2014/main" val="20006"/>
                     </a:ext>
                   </a:extLst>
                 </a:gridCol>
                 <a:gridCol w="1207901">
                   <a:extLst>
                     <a:ext uri="{9D8B030D-6E8A-4147-A177-3AD203B41FA5}">
-                      <a16:colId xmlns:a16="http://schemas.microsoft.com/office/drawing/2014/main" xmlns="" val="20007"/>
+                      <a16:colId xmlns="" xmlns:a16="http://schemas.microsoft.com/office/drawing/2014/main" val="20007"/>
                     </a:ext>
                   </a:extLst>
                 </a:gridCol>
@@ -8230,7 +8230,7 @@
                 </a:tc>
                 <a:extLst>
                   <a:ext uri="{0D108BD9-81ED-4DB2-BD59-A6C34878D82A}">
-                    <a16:rowId xmlns:a16="http://schemas.microsoft.com/office/drawing/2014/main" xmlns="" val="10000"/>
+                    <a16:rowId xmlns="" xmlns:a16="http://schemas.microsoft.com/office/drawing/2014/main" val="10000"/>
                   </a:ext>
                 </a:extLst>
               </a:tr>
@@ -8797,7 +8797,7 @@
                 </a:tc>
                 <a:extLst>
                   <a:ext uri="{0D108BD9-81ED-4DB2-BD59-A6C34878D82A}">
-                    <a16:rowId xmlns:a16="http://schemas.microsoft.com/office/drawing/2014/main" xmlns="" val="10001"/>
+                    <a16:rowId xmlns="" xmlns:a16="http://schemas.microsoft.com/office/drawing/2014/main" val="10001"/>
                   </a:ext>
                 </a:extLst>
               </a:tr>
@@ -8832,7 +8832,7 @@
                 <a:gridCol w="3381300">
                   <a:extLst>
                     <a:ext uri="{9D8B030D-6E8A-4147-A177-3AD203B41FA5}">
-                      <a16:colId xmlns:a16="http://schemas.microsoft.com/office/drawing/2014/main" xmlns="" val="20000"/>
+                      <a16:colId xmlns="" xmlns:a16="http://schemas.microsoft.com/office/drawing/2014/main" val="20000"/>
                     </a:ext>
                   </a:extLst>
                 </a:gridCol>
@@ -8919,7 +8919,7 @@
                 </a:tc>
                 <a:extLst>
                   <a:ext uri="{0D108BD9-81ED-4DB2-BD59-A6C34878D82A}">
-                    <a16:rowId xmlns:a16="http://schemas.microsoft.com/office/drawing/2014/main" xmlns="" val="10000"/>
+                    <a16:rowId xmlns="" xmlns:a16="http://schemas.microsoft.com/office/drawing/2014/main" val="10000"/>
                   </a:ext>
                 </a:extLst>
               </a:tr>
@@ -9015,7 +9015,7 @@
                 </a:tc>
                 <a:extLst>
                   <a:ext uri="{0D108BD9-81ED-4DB2-BD59-A6C34878D82A}">
-                    <a16:rowId xmlns:a16="http://schemas.microsoft.com/office/drawing/2014/main" xmlns="" val="10001"/>
+                    <a16:rowId xmlns="" xmlns:a16="http://schemas.microsoft.com/office/drawing/2014/main" val="10001"/>
                   </a:ext>
                 </a:extLst>
               </a:tr>
@@ -9050,7 +9050,7 @@
                 <a:gridCol w="3381300">
                   <a:extLst>
                     <a:ext uri="{9D8B030D-6E8A-4147-A177-3AD203B41FA5}">
-                      <a16:colId xmlns:a16="http://schemas.microsoft.com/office/drawing/2014/main" xmlns="" val="20000"/>
+                      <a16:colId xmlns="" xmlns:a16="http://schemas.microsoft.com/office/drawing/2014/main" val="20000"/>
                     </a:ext>
                   </a:extLst>
                 </a:gridCol>
@@ -9129,7 +9129,7 @@
                 </a:tc>
                 <a:extLst>
                   <a:ext uri="{0D108BD9-81ED-4DB2-BD59-A6C34878D82A}">
-                    <a16:rowId xmlns:a16="http://schemas.microsoft.com/office/drawing/2014/main" xmlns="" val="10000"/>
+                    <a16:rowId xmlns="" xmlns:a16="http://schemas.microsoft.com/office/drawing/2014/main" val="10000"/>
                   </a:ext>
                 </a:extLst>
               </a:tr>
@@ -9356,7 +9356,7 @@
                 </a:tc>
                 <a:extLst>
                   <a:ext uri="{0D108BD9-81ED-4DB2-BD59-A6C34878D82A}">
-                    <a16:rowId xmlns:a16="http://schemas.microsoft.com/office/drawing/2014/main" xmlns="" val="10001"/>
+                    <a16:rowId xmlns="" xmlns:a16="http://schemas.microsoft.com/office/drawing/2014/main" val="10001"/>
                   </a:ext>
                 </a:extLst>
               </a:tr>
@@ -9391,7 +9391,7 @@
                 <a:gridCol w="3381300">
                   <a:extLst>
                     <a:ext uri="{9D8B030D-6E8A-4147-A177-3AD203B41FA5}">
-                      <a16:colId xmlns:a16="http://schemas.microsoft.com/office/drawing/2014/main" xmlns="" val="20000"/>
+                      <a16:colId xmlns="" xmlns:a16="http://schemas.microsoft.com/office/drawing/2014/main" val="20000"/>
                     </a:ext>
                   </a:extLst>
                 </a:gridCol>
@@ -9470,7 +9470,7 @@
                 </a:tc>
                 <a:extLst>
                   <a:ext uri="{0D108BD9-81ED-4DB2-BD59-A6C34878D82A}">
-                    <a16:rowId xmlns:a16="http://schemas.microsoft.com/office/drawing/2014/main" xmlns="" val="10000"/>
+                    <a16:rowId xmlns="" xmlns:a16="http://schemas.microsoft.com/office/drawing/2014/main" val="10000"/>
                   </a:ext>
                 </a:extLst>
               </a:tr>
@@ -9573,7 +9573,7 @@
                 </a:tc>
                 <a:extLst>
                   <a:ext uri="{0D108BD9-81ED-4DB2-BD59-A6C34878D82A}">
-                    <a16:rowId xmlns:a16="http://schemas.microsoft.com/office/drawing/2014/main" xmlns="" val="10001"/>
+                    <a16:rowId xmlns="" xmlns:a16="http://schemas.microsoft.com/office/drawing/2014/main" val="10001"/>
                   </a:ext>
                 </a:extLst>
               </a:tr>
@@ -9687,56 +9687,56 @@
                 <a:gridCol w="2183446">
                   <a:extLst>
                     <a:ext uri="{9D8B030D-6E8A-4147-A177-3AD203B41FA5}">
-                      <a16:colId xmlns:a16="http://schemas.microsoft.com/office/drawing/2014/main" xmlns="" val="20000"/>
+                      <a16:colId xmlns="" xmlns:a16="http://schemas.microsoft.com/office/drawing/2014/main" val="20000"/>
                     </a:ext>
                   </a:extLst>
                 </a:gridCol>
                 <a:gridCol w="1207901">
                   <a:extLst>
                     <a:ext uri="{9D8B030D-6E8A-4147-A177-3AD203B41FA5}">
-                      <a16:colId xmlns:a16="http://schemas.microsoft.com/office/drawing/2014/main" xmlns="" val="20001"/>
+                      <a16:colId xmlns="" xmlns:a16="http://schemas.microsoft.com/office/drawing/2014/main" val="20001"/>
                     </a:ext>
                   </a:extLst>
                 </a:gridCol>
                 <a:gridCol w="1207901">
                   <a:extLst>
                     <a:ext uri="{9D8B030D-6E8A-4147-A177-3AD203B41FA5}">
-                      <a16:colId xmlns:a16="http://schemas.microsoft.com/office/drawing/2014/main" xmlns="" val="20002"/>
+                      <a16:colId xmlns="" xmlns:a16="http://schemas.microsoft.com/office/drawing/2014/main" val="20002"/>
                     </a:ext>
                   </a:extLst>
                 </a:gridCol>
                 <a:gridCol w="1207901">
                   <a:extLst>
                     <a:ext uri="{9D8B030D-6E8A-4147-A177-3AD203B41FA5}">
-                      <a16:colId xmlns:a16="http://schemas.microsoft.com/office/drawing/2014/main" xmlns="" val="20003"/>
+                      <a16:colId xmlns="" xmlns:a16="http://schemas.microsoft.com/office/drawing/2014/main" val="20003"/>
                     </a:ext>
                   </a:extLst>
                 </a:gridCol>
                 <a:gridCol w="1207901">
                   <a:extLst>
                     <a:ext uri="{9D8B030D-6E8A-4147-A177-3AD203B41FA5}">
-                      <a16:colId xmlns:a16="http://schemas.microsoft.com/office/drawing/2014/main" xmlns="" val="20004"/>
+                      <a16:colId xmlns="" xmlns:a16="http://schemas.microsoft.com/office/drawing/2014/main" val="20004"/>
                     </a:ext>
                   </a:extLst>
                 </a:gridCol>
                 <a:gridCol w="1207901">
                   <a:extLst>
                     <a:ext uri="{9D8B030D-6E8A-4147-A177-3AD203B41FA5}">
-                      <a16:colId xmlns:a16="http://schemas.microsoft.com/office/drawing/2014/main" xmlns="" val="20005"/>
+                      <a16:colId xmlns="" xmlns:a16="http://schemas.microsoft.com/office/drawing/2014/main" val="20005"/>
                     </a:ext>
                   </a:extLst>
                 </a:gridCol>
                 <a:gridCol w="1207901">
                   <a:extLst>
                     <a:ext uri="{9D8B030D-6E8A-4147-A177-3AD203B41FA5}">
-                      <a16:colId xmlns:a16="http://schemas.microsoft.com/office/drawing/2014/main" xmlns="" val="20006"/>
+                      <a16:colId xmlns="" xmlns:a16="http://schemas.microsoft.com/office/drawing/2014/main" val="20006"/>
                     </a:ext>
                   </a:extLst>
                 </a:gridCol>
                 <a:gridCol w="1207901">
                   <a:extLst>
                     <a:ext uri="{9D8B030D-6E8A-4147-A177-3AD203B41FA5}">
-                      <a16:colId xmlns:a16="http://schemas.microsoft.com/office/drawing/2014/main" xmlns="" val="20007"/>
+                      <a16:colId xmlns="" xmlns:a16="http://schemas.microsoft.com/office/drawing/2014/main" val="20007"/>
                     </a:ext>
                   </a:extLst>
                 </a:gridCol>
@@ -10325,7 +10325,7 @@
                 </a:tc>
                 <a:extLst>
                   <a:ext uri="{0D108BD9-81ED-4DB2-BD59-A6C34878D82A}">
-                    <a16:rowId xmlns:a16="http://schemas.microsoft.com/office/drawing/2014/main" xmlns="" val="10000"/>
+                    <a16:rowId xmlns="" xmlns:a16="http://schemas.microsoft.com/office/drawing/2014/main" val="10000"/>
                   </a:ext>
                 </a:extLst>
               </a:tr>
@@ -10892,7 +10892,7 @@
                 </a:tc>
                 <a:extLst>
                   <a:ext uri="{0D108BD9-81ED-4DB2-BD59-A6C34878D82A}">
-                    <a16:rowId xmlns:a16="http://schemas.microsoft.com/office/drawing/2014/main" xmlns="" val="10001"/>
+                    <a16:rowId xmlns="" xmlns:a16="http://schemas.microsoft.com/office/drawing/2014/main" val="10001"/>
                   </a:ext>
                 </a:extLst>
               </a:tr>
@@ -10927,7 +10927,7 @@
                 <a:gridCol w="3381300">
                   <a:extLst>
                     <a:ext uri="{9D8B030D-6E8A-4147-A177-3AD203B41FA5}">
-                      <a16:colId xmlns:a16="http://schemas.microsoft.com/office/drawing/2014/main" xmlns="" val="20000"/>
+                      <a16:colId xmlns="" xmlns:a16="http://schemas.microsoft.com/office/drawing/2014/main" val="20000"/>
                     </a:ext>
                   </a:extLst>
                 </a:gridCol>
@@ -11014,7 +11014,7 @@
                 </a:tc>
                 <a:extLst>
                   <a:ext uri="{0D108BD9-81ED-4DB2-BD59-A6C34878D82A}">
-                    <a16:rowId xmlns:a16="http://schemas.microsoft.com/office/drawing/2014/main" xmlns="" val="10000"/>
+                    <a16:rowId xmlns="" xmlns:a16="http://schemas.microsoft.com/office/drawing/2014/main" val="10000"/>
                   </a:ext>
                 </a:extLst>
               </a:tr>
@@ -11083,7 +11083,7 @@
                 </a:tc>
                 <a:extLst>
                   <a:ext uri="{0D108BD9-81ED-4DB2-BD59-A6C34878D82A}">
-                    <a16:rowId xmlns:a16="http://schemas.microsoft.com/office/drawing/2014/main" xmlns="" val="10001"/>
+                    <a16:rowId xmlns="" xmlns:a16="http://schemas.microsoft.com/office/drawing/2014/main" val="10001"/>
                   </a:ext>
                 </a:extLst>
               </a:tr>
@@ -11118,7 +11118,7 @@
                 <a:gridCol w="3381300">
                   <a:extLst>
                     <a:ext uri="{9D8B030D-6E8A-4147-A177-3AD203B41FA5}">
-                      <a16:colId xmlns:a16="http://schemas.microsoft.com/office/drawing/2014/main" xmlns="" val="20000"/>
+                      <a16:colId xmlns="" xmlns:a16="http://schemas.microsoft.com/office/drawing/2014/main" val="20000"/>
                     </a:ext>
                   </a:extLst>
                 </a:gridCol>
@@ -11197,7 +11197,7 @@
                 </a:tc>
                 <a:extLst>
                   <a:ext uri="{0D108BD9-81ED-4DB2-BD59-A6C34878D82A}">
-                    <a16:rowId xmlns:a16="http://schemas.microsoft.com/office/drawing/2014/main" xmlns="" val="10000"/>
+                    <a16:rowId xmlns="" xmlns:a16="http://schemas.microsoft.com/office/drawing/2014/main" val="10000"/>
                   </a:ext>
                 </a:extLst>
               </a:tr>
@@ -11284,7 +11284,7 @@
                 </a:tc>
                 <a:extLst>
                   <a:ext uri="{0D108BD9-81ED-4DB2-BD59-A6C34878D82A}">
-                    <a16:rowId xmlns:a16="http://schemas.microsoft.com/office/drawing/2014/main" xmlns="" val="10001"/>
+                    <a16:rowId xmlns="" xmlns:a16="http://schemas.microsoft.com/office/drawing/2014/main" val="10001"/>
                   </a:ext>
                 </a:extLst>
               </a:tr>
@@ -11319,7 +11319,7 @@
                 <a:gridCol w="3381300">
                   <a:extLst>
                     <a:ext uri="{9D8B030D-6E8A-4147-A177-3AD203B41FA5}">
-                      <a16:colId xmlns:a16="http://schemas.microsoft.com/office/drawing/2014/main" xmlns="" val="20000"/>
+                      <a16:colId xmlns="" xmlns:a16="http://schemas.microsoft.com/office/drawing/2014/main" val="20000"/>
                     </a:ext>
                   </a:extLst>
                 </a:gridCol>
@@ -11398,7 +11398,7 @@
                 </a:tc>
                 <a:extLst>
                   <a:ext uri="{0D108BD9-81ED-4DB2-BD59-A6C34878D82A}">
-                    <a16:rowId xmlns:a16="http://schemas.microsoft.com/office/drawing/2014/main" xmlns="" val="10000"/>
+                    <a16:rowId xmlns="" xmlns:a16="http://schemas.microsoft.com/office/drawing/2014/main" val="10000"/>
                   </a:ext>
                 </a:extLst>
               </a:tr>
@@ -11528,7 +11528,7 @@
                 </a:tc>
                 <a:extLst>
                   <a:ext uri="{0D108BD9-81ED-4DB2-BD59-A6C34878D82A}">
-                    <a16:rowId xmlns:a16="http://schemas.microsoft.com/office/drawing/2014/main" xmlns="" val="10001"/>
+                    <a16:rowId xmlns="" xmlns:a16="http://schemas.microsoft.com/office/drawing/2014/main" val="10001"/>
                   </a:ext>
                 </a:extLst>
               </a:tr>
@@ -11642,56 +11642,56 @@
                 <a:gridCol w="2173603">
                   <a:extLst>
                     <a:ext uri="{9D8B030D-6E8A-4147-A177-3AD203B41FA5}">
-                      <a16:colId xmlns:a16="http://schemas.microsoft.com/office/drawing/2014/main" xmlns="" val="20000"/>
+                      <a16:colId xmlns="" xmlns:a16="http://schemas.microsoft.com/office/drawing/2014/main" val="20000"/>
                     </a:ext>
                   </a:extLst>
                 </a:gridCol>
                 <a:gridCol w="1202455">
                   <a:extLst>
                     <a:ext uri="{9D8B030D-6E8A-4147-A177-3AD203B41FA5}">
-                      <a16:colId xmlns:a16="http://schemas.microsoft.com/office/drawing/2014/main" xmlns="" val="20001"/>
+                      <a16:colId xmlns="" xmlns:a16="http://schemas.microsoft.com/office/drawing/2014/main" val="20001"/>
                     </a:ext>
                   </a:extLst>
                 </a:gridCol>
                 <a:gridCol w="1202455">
                   <a:extLst>
                     <a:ext uri="{9D8B030D-6E8A-4147-A177-3AD203B41FA5}">
-                      <a16:colId xmlns:a16="http://schemas.microsoft.com/office/drawing/2014/main" xmlns="" val="20002"/>
+                      <a16:colId xmlns="" xmlns:a16="http://schemas.microsoft.com/office/drawing/2014/main" val="20002"/>
                     </a:ext>
                   </a:extLst>
                 </a:gridCol>
                 <a:gridCol w="1202455">
                   <a:extLst>
                     <a:ext uri="{9D8B030D-6E8A-4147-A177-3AD203B41FA5}">
-                      <a16:colId xmlns:a16="http://schemas.microsoft.com/office/drawing/2014/main" xmlns="" val="20003"/>
+                      <a16:colId xmlns="" xmlns:a16="http://schemas.microsoft.com/office/drawing/2014/main" val="20003"/>
                     </a:ext>
                   </a:extLst>
                 </a:gridCol>
                 <a:gridCol w="1202455">
                   <a:extLst>
                     <a:ext uri="{9D8B030D-6E8A-4147-A177-3AD203B41FA5}">
-                      <a16:colId xmlns:a16="http://schemas.microsoft.com/office/drawing/2014/main" xmlns="" val="20004"/>
+                      <a16:colId xmlns="" xmlns:a16="http://schemas.microsoft.com/office/drawing/2014/main" val="20004"/>
                     </a:ext>
                   </a:extLst>
                 </a:gridCol>
                 <a:gridCol w="1202455">
                   <a:extLst>
                     <a:ext uri="{9D8B030D-6E8A-4147-A177-3AD203B41FA5}">
-                      <a16:colId xmlns:a16="http://schemas.microsoft.com/office/drawing/2014/main" xmlns="" val="20005"/>
+                      <a16:colId xmlns="" xmlns:a16="http://schemas.microsoft.com/office/drawing/2014/main" val="20005"/>
                     </a:ext>
                   </a:extLst>
                 </a:gridCol>
                 <a:gridCol w="1202455">
                   <a:extLst>
                     <a:ext uri="{9D8B030D-6E8A-4147-A177-3AD203B41FA5}">
-                      <a16:colId xmlns:a16="http://schemas.microsoft.com/office/drawing/2014/main" xmlns="" val="20006"/>
+                      <a16:colId xmlns="" xmlns:a16="http://schemas.microsoft.com/office/drawing/2014/main" val="20006"/>
                     </a:ext>
                   </a:extLst>
                 </a:gridCol>
                 <a:gridCol w="1202455">
                   <a:extLst>
                     <a:ext uri="{9D8B030D-6E8A-4147-A177-3AD203B41FA5}">
-                      <a16:colId xmlns:a16="http://schemas.microsoft.com/office/drawing/2014/main" xmlns="" val="20007"/>
+                      <a16:colId xmlns="" xmlns:a16="http://schemas.microsoft.com/office/drawing/2014/main" val="20007"/>
                     </a:ext>
                   </a:extLst>
                 </a:gridCol>
@@ -12280,7 +12280,7 @@
                 </a:tc>
                 <a:extLst>
                   <a:ext uri="{0D108BD9-81ED-4DB2-BD59-A6C34878D82A}">
-                    <a16:rowId xmlns:a16="http://schemas.microsoft.com/office/drawing/2014/main" xmlns="" val="10000"/>
+                    <a16:rowId xmlns="" xmlns:a16="http://schemas.microsoft.com/office/drawing/2014/main" val="10000"/>
                   </a:ext>
                 </a:extLst>
               </a:tr>
@@ -12855,7 +12855,7 @@
                 </a:tc>
                 <a:extLst>
                   <a:ext uri="{0D108BD9-81ED-4DB2-BD59-A6C34878D82A}">
-                    <a16:rowId xmlns:a16="http://schemas.microsoft.com/office/drawing/2014/main" xmlns="" val="10001"/>
+                    <a16:rowId xmlns="" xmlns:a16="http://schemas.microsoft.com/office/drawing/2014/main" val="10001"/>
                   </a:ext>
                 </a:extLst>
               </a:tr>
@@ -12890,7 +12890,7 @@
                 <a:gridCol w="3381300">
                   <a:extLst>
                     <a:ext uri="{9D8B030D-6E8A-4147-A177-3AD203B41FA5}">
-                      <a16:colId xmlns:a16="http://schemas.microsoft.com/office/drawing/2014/main" xmlns="" val="20000"/>
+                      <a16:colId xmlns="" xmlns:a16="http://schemas.microsoft.com/office/drawing/2014/main" val="20000"/>
                     </a:ext>
                   </a:extLst>
                 </a:gridCol>
@@ -12977,7 +12977,7 @@
                 </a:tc>
                 <a:extLst>
                   <a:ext uri="{0D108BD9-81ED-4DB2-BD59-A6C34878D82A}">
-                    <a16:rowId xmlns:a16="http://schemas.microsoft.com/office/drawing/2014/main" xmlns="" val="10000"/>
+                    <a16:rowId xmlns="" xmlns:a16="http://schemas.microsoft.com/office/drawing/2014/main" val="10000"/>
                   </a:ext>
                 </a:extLst>
               </a:tr>
@@ -13064,7 +13064,7 @@
                 </a:tc>
                 <a:extLst>
                   <a:ext uri="{0D108BD9-81ED-4DB2-BD59-A6C34878D82A}">
-                    <a16:rowId xmlns:a16="http://schemas.microsoft.com/office/drawing/2014/main" xmlns="" val="10001"/>
+                    <a16:rowId xmlns="" xmlns:a16="http://schemas.microsoft.com/office/drawing/2014/main" val="10001"/>
                   </a:ext>
                 </a:extLst>
               </a:tr>
@@ -13079,7 +13079,7 @@
           <p:nvPr>
             <p:extLst>
               <p:ext uri="{D42A27DB-BD31-4B8C-83A1-F6EECF244321}">
-                <p14:modId xmlns:p14="http://schemas.microsoft.com/office/powerpoint/2010/main" val="2741704035"/>
+                <p14:modId xmlns:p14="http://schemas.microsoft.com/office/powerpoint/2010/main" val="1296808982"/>
               </p:ext>
             </p:extLst>
           </p:nvPr>
@@ -13099,7 +13099,7 @@
                 <a:gridCol w="3381300">
                   <a:extLst>
                     <a:ext uri="{9D8B030D-6E8A-4147-A177-3AD203B41FA5}">
-                      <a16:colId xmlns:a16="http://schemas.microsoft.com/office/drawing/2014/main" xmlns="" val="20000"/>
+                      <a16:colId xmlns="" xmlns:a16="http://schemas.microsoft.com/office/drawing/2014/main" val="20000"/>
                     </a:ext>
                   </a:extLst>
                 </a:gridCol>
@@ -13178,7 +13178,7 @@
                 </a:tc>
                 <a:extLst>
                   <a:ext uri="{0D108BD9-81ED-4DB2-BD59-A6C34878D82A}">
-                    <a16:rowId xmlns:a16="http://schemas.microsoft.com/office/drawing/2014/main" xmlns="" val="10000"/>
+                    <a16:rowId xmlns="" xmlns:a16="http://schemas.microsoft.com/office/drawing/2014/main" val="10000"/>
                   </a:ext>
                 </a:extLst>
               </a:tr>
@@ -13206,8 +13206,13 @@
                       </a:r>
                       <a:r>
                         <a:rPr lang="en-US" sz="1100" baseline="0" dirty="0" smtClean="0"/>
-                        <a:t> rate schedule.</a:t>
+                        <a:t> rate schedule</a:t>
                       </a:r>
+                      <a:r>
+                        <a:rPr lang="en-US" sz="1100" baseline="0" dirty="0" smtClean="0"/>
+                        <a:t>. (Alex to send link to GSA Schedule 70 to Ken.) </a:t>
+                      </a:r>
+                      <a:endParaRPr lang="en-US" sz="1100" baseline="0" dirty="0" smtClean="0"/>
                     </a:p>
                     <a:p>
                       <a:pPr marL="115888" lvl="0" indent="-115888" algn="l" rtl="0">
@@ -13293,7 +13298,7 @@
                 </a:tc>
                 <a:extLst>
                   <a:ext uri="{0D108BD9-81ED-4DB2-BD59-A6C34878D82A}">
-                    <a16:rowId xmlns:a16="http://schemas.microsoft.com/office/drawing/2014/main" xmlns="" val="10001"/>
+                    <a16:rowId xmlns="" xmlns:a16="http://schemas.microsoft.com/office/drawing/2014/main" val="10001"/>
                   </a:ext>
                 </a:extLst>
               </a:tr>
@@ -13308,14 +13313,14 @@
           <p:nvPr>
             <p:extLst>
               <p:ext uri="{D42A27DB-BD31-4B8C-83A1-F6EECF244321}">
-                <p14:modId xmlns:p14="http://schemas.microsoft.com/office/powerpoint/2010/main" val="192291857"/>
+                <p14:modId xmlns:p14="http://schemas.microsoft.com/office/powerpoint/2010/main" val="466260587"/>
               </p:ext>
             </p:extLst>
           </p:nvPr>
         </p:nvGraphicFramePr>
         <p:xfrm>
           <a:off x="8177725" y="2546175"/>
-          <a:ext cx="3381300" cy="3529275"/>
+          <a:ext cx="3381300" cy="3333850"/>
         </p:xfrm>
         <a:graphic>
           <a:graphicData uri="http://schemas.openxmlformats.org/drawingml/2006/table">
@@ -13328,7 +13333,7 @@
                 <a:gridCol w="3381300">
                   <a:extLst>
                     <a:ext uri="{9D8B030D-6E8A-4147-A177-3AD203B41FA5}">
-                      <a16:colId xmlns:a16="http://schemas.microsoft.com/office/drawing/2014/main" xmlns="" val="20000"/>
+                      <a16:colId xmlns="" xmlns:a16="http://schemas.microsoft.com/office/drawing/2014/main" val="20000"/>
                     </a:ext>
                   </a:extLst>
                 </a:gridCol>
@@ -13407,7 +13412,7 @@
                 </a:tc>
                 <a:extLst>
                   <a:ext uri="{0D108BD9-81ED-4DB2-BD59-A6C34878D82A}">
-                    <a16:rowId xmlns:a16="http://schemas.microsoft.com/office/drawing/2014/main" xmlns="" val="10000"/>
+                    <a16:rowId xmlns="" xmlns:a16="http://schemas.microsoft.com/office/drawing/2014/main" val="10000"/>
                   </a:ext>
                 </a:extLst>
               </a:tr>
@@ -13582,24 +13587,7 @@
                           <a:cs typeface="Arial"/>
                           <a:sym typeface="Arial"/>
                         </a:rPr>
-                        <a:t>Government shutdown: Will the team be able to continue working on the tasks defined for Sprint 0? If so, who will be the FEC POC </a:t>
-                      </a:r>
-                      <a:r>
-                        <a:rPr kumimoji="0" lang="en-US" sz="1100" b="0" i="0" u="none" strike="noStrike" kern="0" cap="none" spc="0" normalizeH="0" baseline="0" noProof="0" smtClean="0">
-                          <a:ln>
-                            <a:noFill/>
-                          </a:ln>
-                          <a:solidFill>
-                            <a:srgbClr val="000000"/>
-                          </a:solidFill>
-                          <a:effectLst/>
-                          <a:uLnTx/>
-                          <a:uFillTx/>
-                          <a:latin typeface="Arial"/>
-                          <a:cs typeface="Arial"/>
-                          <a:sym typeface="Arial"/>
-                        </a:rPr>
-                        <a:t>during that time? </a:t>
+                        <a:t>Government shutdown: Will the team be able to continue working on the tasks defined for Sprint 0? If so, who will be the FEC POC during that time? </a:t>
                       </a:r>
                       <a:endParaRPr kumimoji="0" lang="en-US" sz="1100" b="0" i="0" u="none" strike="noStrike" kern="0" cap="none" spc="0" normalizeH="0" baseline="0" noProof="0" dirty="0" smtClean="0">
                         <a:ln>
@@ -13616,28 +13604,6 @@
                         <a:sym typeface="Arial"/>
                       </a:endParaRPr>
                     </a:p>
-                    <a:p>
-                      <a:pPr marL="0" marR="0" lvl="0" indent="0" algn="l" defTabSz="914400" rtl="0" eaLnBrk="1" fontAlgn="auto" latinLnBrk="0" hangingPunct="1">
-                        <a:lnSpc>
-                          <a:spcPct val="100000"/>
-                        </a:lnSpc>
-                        <a:spcBef>
-                          <a:spcPts val="0"/>
-                        </a:spcBef>
-                        <a:spcAft>
-                          <a:spcPts val="600"/>
-                        </a:spcAft>
-                        <a:buClr>
-                          <a:srgbClr val="000000"/>
-                        </a:buClr>
-                        <a:buSzPts val="1100"/>
-                        <a:buFont typeface="Arial" panose="020B0604020202020204" pitchFamily="34" charset="0"/>
-                        <a:buNone/>
-                        <a:tabLst/>
-                        <a:defRPr/>
-                      </a:pPr>
-                      <a:endParaRPr lang="en-US" sz="1100" baseline="0" dirty="0" smtClean="0"/>
-                    </a:p>
                   </a:txBody>
                   <a:tcPr marL="63500" marR="63500" marT="63500" marB="63500">
                     <a:lnL w="12700" cap="flat" cmpd="sng">
@@ -13680,7 +13646,7 @@
                 </a:tc>
                 <a:extLst>
                   <a:ext uri="{0D108BD9-81ED-4DB2-BD59-A6C34878D82A}">
-                    <a16:rowId xmlns:a16="http://schemas.microsoft.com/office/drawing/2014/main" xmlns="" val="10001"/>
+                    <a16:rowId xmlns="" xmlns:a16="http://schemas.microsoft.com/office/drawing/2014/main" val="10001"/>
                   </a:ext>
                 </a:extLst>
               </a:tr>
@@ -13798,42 +13764,42 @@
                 <a:gridCol w="2623482">
                   <a:extLst>
                     <a:ext uri="{9D8B030D-6E8A-4147-A177-3AD203B41FA5}">
-                      <a16:colId xmlns:a16="http://schemas.microsoft.com/office/drawing/2014/main" xmlns="" val="20000"/>
+                      <a16:colId xmlns="" xmlns:a16="http://schemas.microsoft.com/office/drawing/2014/main" val="20000"/>
                     </a:ext>
                   </a:extLst>
                 </a:gridCol>
                 <a:gridCol w="813627">
                   <a:extLst>
                     <a:ext uri="{9D8B030D-6E8A-4147-A177-3AD203B41FA5}">
-                      <a16:colId xmlns:a16="http://schemas.microsoft.com/office/drawing/2014/main" xmlns="" val="20001"/>
+                      <a16:colId xmlns="" xmlns:a16="http://schemas.microsoft.com/office/drawing/2014/main" val="20001"/>
                     </a:ext>
                   </a:extLst>
                 </a:gridCol>
                 <a:gridCol w="1348902">
                   <a:extLst>
                     <a:ext uri="{9D8B030D-6E8A-4147-A177-3AD203B41FA5}">
-                      <a16:colId xmlns:a16="http://schemas.microsoft.com/office/drawing/2014/main" xmlns="" val="20002"/>
+                      <a16:colId xmlns="" xmlns:a16="http://schemas.microsoft.com/office/drawing/2014/main" val="20002"/>
                     </a:ext>
                   </a:extLst>
                 </a:gridCol>
                 <a:gridCol w="1167319">
                   <a:extLst>
                     <a:ext uri="{9D8B030D-6E8A-4147-A177-3AD203B41FA5}">
-                      <a16:colId xmlns:a16="http://schemas.microsoft.com/office/drawing/2014/main" xmlns="" val="20003"/>
+                      <a16:colId xmlns="" xmlns:a16="http://schemas.microsoft.com/office/drawing/2014/main" val="20003"/>
                     </a:ext>
                   </a:extLst>
                 </a:gridCol>
                 <a:gridCol w="3891064">
                   <a:extLst>
                     <a:ext uri="{9D8B030D-6E8A-4147-A177-3AD203B41FA5}">
-                      <a16:colId xmlns:a16="http://schemas.microsoft.com/office/drawing/2014/main" xmlns="" val="20004"/>
+                      <a16:colId xmlns="" xmlns:a16="http://schemas.microsoft.com/office/drawing/2014/main" val="20004"/>
                     </a:ext>
                   </a:extLst>
                 </a:gridCol>
                 <a:gridCol w="1348901">
                   <a:extLst>
                     <a:ext uri="{9D8B030D-6E8A-4147-A177-3AD203B41FA5}">
-                      <a16:colId xmlns:a16="http://schemas.microsoft.com/office/drawing/2014/main" xmlns="" val="20005"/>
+                      <a16:colId xmlns="" xmlns:a16="http://schemas.microsoft.com/office/drawing/2014/main" val="20005"/>
                     </a:ext>
                   </a:extLst>
                 </a:gridCol>
@@ -14293,7 +14259,7 @@
                 </a:tc>
                 <a:extLst>
                   <a:ext uri="{0D108BD9-81ED-4DB2-BD59-A6C34878D82A}">
-                    <a16:rowId xmlns:a16="http://schemas.microsoft.com/office/drawing/2014/main" xmlns="" val="10000"/>
+                    <a16:rowId xmlns="" xmlns:a16="http://schemas.microsoft.com/office/drawing/2014/main" val="10000"/>
                   </a:ext>
                 </a:extLst>
               </a:tr>
@@ -14736,7 +14702,7 @@
                 </a:tc>
                 <a:extLst>
                   <a:ext uri="{0D108BD9-81ED-4DB2-BD59-A6C34878D82A}">
-                    <a16:rowId xmlns:a16="http://schemas.microsoft.com/office/drawing/2014/main" xmlns="" val="10001"/>
+                    <a16:rowId xmlns="" xmlns:a16="http://schemas.microsoft.com/office/drawing/2014/main" val="10001"/>
                   </a:ext>
                 </a:extLst>
               </a:tr>
@@ -15131,7 +15097,7 @@
                 </a:tc>
                 <a:extLst>
                   <a:ext uri="{0D108BD9-81ED-4DB2-BD59-A6C34878D82A}">
-                    <a16:rowId xmlns:a16="http://schemas.microsoft.com/office/drawing/2014/main" xmlns="" val="10003"/>
+                    <a16:rowId xmlns="" xmlns:a16="http://schemas.microsoft.com/office/drawing/2014/main" val="10003"/>
                   </a:ext>
                 </a:extLst>
               </a:tr>
@@ -15494,7 +15460,7 @@
                 </a:tc>
                 <a:extLst>
                   <a:ext uri="{0D108BD9-81ED-4DB2-BD59-A6C34878D82A}">
-                    <a16:rowId xmlns:a16="http://schemas.microsoft.com/office/drawing/2014/main" xmlns="" val="3646535492"/>
+                    <a16:rowId xmlns="" xmlns:a16="http://schemas.microsoft.com/office/drawing/2014/main" val="3646535492"/>
                   </a:ext>
                 </a:extLst>
               </a:tr>
@@ -15857,7 +15823,7 @@
                 </a:tc>
                 <a:extLst>
                   <a:ext uri="{0D108BD9-81ED-4DB2-BD59-A6C34878D82A}">
-                    <a16:rowId xmlns:a16="http://schemas.microsoft.com/office/drawing/2014/main" xmlns="" val="376521511"/>
+                    <a16:rowId xmlns="" xmlns:a16="http://schemas.microsoft.com/office/drawing/2014/main" val="376521511"/>
                   </a:ext>
                 </a:extLst>
               </a:tr>
@@ -16055,28 +16021,28 @@
                 <a:gridCol w="1052956">
                   <a:extLst>
                     <a:ext uri="{9D8B030D-6E8A-4147-A177-3AD203B41FA5}">
-                      <a16:colId xmlns:a16="http://schemas.microsoft.com/office/drawing/2014/main" xmlns="" val="20000"/>
+                      <a16:colId xmlns="" xmlns:a16="http://schemas.microsoft.com/office/drawing/2014/main" val="20000"/>
                     </a:ext>
                   </a:extLst>
                 </a:gridCol>
                 <a:gridCol w="3114471">
                   <a:extLst>
                     <a:ext uri="{9D8B030D-6E8A-4147-A177-3AD203B41FA5}">
-                      <a16:colId xmlns:a16="http://schemas.microsoft.com/office/drawing/2014/main" xmlns="" val="20001"/>
+                      <a16:colId xmlns="" xmlns:a16="http://schemas.microsoft.com/office/drawing/2014/main" val="20001"/>
                     </a:ext>
                   </a:extLst>
                 </a:gridCol>
                 <a:gridCol w="3114471">
                   <a:extLst>
                     <a:ext uri="{9D8B030D-6E8A-4147-A177-3AD203B41FA5}">
-                      <a16:colId xmlns:a16="http://schemas.microsoft.com/office/drawing/2014/main" xmlns="" val="20002"/>
+                      <a16:colId xmlns="" xmlns:a16="http://schemas.microsoft.com/office/drawing/2014/main" val="20002"/>
                     </a:ext>
                   </a:extLst>
                 </a:gridCol>
                 <a:gridCol w="3114471">
                   <a:extLst>
                     <a:ext uri="{9D8B030D-6E8A-4147-A177-3AD203B41FA5}">
-                      <a16:colId xmlns:a16="http://schemas.microsoft.com/office/drawing/2014/main" xmlns="" val="20003"/>
+                      <a16:colId xmlns="" xmlns:a16="http://schemas.microsoft.com/office/drawing/2014/main" val="20003"/>
                     </a:ext>
                   </a:extLst>
                 </a:gridCol>
@@ -16373,7 +16339,7 @@
                 </a:tc>
                 <a:extLst>
                   <a:ext uri="{0D108BD9-81ED-4DB2-BD59-A6C34878D82A}">
-                    <a16:rowId xmlns:a16="http://schemas.microsoft.com/office/drawing/2014/main" xmlns="" val="10000"/>
+                    <a16:rowId xmlns="" xmlns:a16="http://schemas.microsoft.com/office/drawing/2014/main" val="10000"/>
                   </a:ext>
                 </a:extLst>
               </a:tr>
@@ -16635,7 +16601,7 @@
                 </a:tc>
                 <a:extLst>
                   <a:ext uri="{0D108BD9-81ED-4DB2-BD59-A6C34878D82A}">
-                    <a16:rowId xmlns:a16="http://schemas.microsoft.com/office/drawing/2014/main" xmlns="" val="10001"/>
+                    <a16:rowId xmlns="" xmlns:a16="http://schemas.microsoft.com/office/drawing/2014/main" val="10001"/>
                   </a:ext>
                 </a:extLst>
               </a:tr>
@@ -17305,7 +17271,7 @@
                 </a:tc>
                 <a:extLst>
                   <a:ext uri="{0D108BD9-81ED-4DB2-BD59-A6C34878D82A}">
-                    <a16:rowId xmlns:a16="http://schemas.microsoft.com/office/drawing/2014/main" xmlns="" val="10002"/>
+                    <a16:rowId xmlns="" xmlns:a16="http://schemas.microsoft.com/office/drawing/2014/main" val="10002"/>
                   </a:ext>
                 </a:extLst>
               </a:tr>
@@ -17579,7 +17545,7 @@
                 </a:tc>
                 <a:extLst>
                   <a:ext uri="{0D108BD9-81ED-4DB2-BD59-A6C34878D82A}">
-                    <a16:rowId xmlns:a16="http://schemas.microsoft.com/office/drawing/2014/main" xmlns="" val="10003"/>
+                    <a16:rowId xmlns="" xmlns:a16="http://schemas.microsoft.com/office/drawing/2014/main" val="10003"/>
                   </a:ext>
                 </a:extLst>
               </a:tr>

</xml_diff>